<commit_message>
New version of ittralee presentation
</commit_message>
<xml_diff>
--- a/ittralee_func_concepts/functional_language_concepts.pptx
+++ b/ittralee_func_concepts/functional_language_concepts.pptx
@@ -259,7 +259,7 @@
           <a:p>
             <a:fld id="{A7C9CC5A-7358-4334-9046-5B2A00250028}" type="datetimeFigureOut">
               <a:rPr lang="en-IE" smtClean="0"/>
-              <a:t>22/01/2019</a:t>
+              <a:t>23/01/2019</a:t>
             </a:fld>
             <a:endParaRPr lang="en-IE"/>
           </a:p>
@@ -429,7 +429,7 @@
           <a:p>
             <a:fld id="{A7C9CC5A-7358-4334-9046-5B2A00250028}" type="datetimeFigureOut">
               <a:rPr lang="en-IE" smtClean="0"/>
-              <a:t>22/01/2019</a:t>
+              <a:t>23/01/2019</a:t>
             </a:fld>
             <a:endParaRPr lang="en-IE"/>
           </a:p>
@@ -609,7 +609,7 @@
           <a:p>
             <a:fld id="{A7C9CC5A-7358-4334-9046-5B2A00250028}" type="datetimeFigureOut">
               <a:rPr lang="en-IE" smtClean="0"/>
-              <a:t>22/01/2019</a:t>
+              <a:t>23/01/2019</a:t>
             </a:fld>
             <a:endParaRPr lang="en-IE"/>
           </a:p>
@@ -779,7 +779,7 @@
           <a:p>
             <a:fld id="{A7C9CC5A-7358-4334-9046-5B2A00250028}" type="datetimeFigureOut">
               <a:rPr lang="en-IE" smtClean="0"/>
-              <a:t>22/01/2019</a:t>
+              <a:t>23/01/2019</a:t>
             </a:fld>
             <a:endParaRPr lang="en-IE"/>
           </a:p>
@@ -1025,7 +1025,7 @@
           <a:p>
             <a:fld id="{A7C9CC5A-7358-4334-9046-5B2A00250028}" type="datetimeFigureOut">
               <a:rPr lang="en-IE" smtClean="0"/>
-              <a:t>22/01/2019</a:t>
+              <a:t>23/01/2019</a:t>
             </a:fld>
             <a:endParaRPr lang="en-IE"/>
           </a:p>
@@ -1257,7 +1257,7 @@
           <a:p>
             <a:fld id="{A7C9CC5A-7358-4334-9046-5B2A00250028}" type="datetimeFigureOut">
               <a:rPr lang="en-IE" smtClean="0"/>
-              <a:t>22/01/2019</a:t>
+              <a:t>23/01/2019</a:t>
             </a:fld>
             <a:endParaRPr lang="en-IE"/>
           </a:p>
@@ -1624,7 +1624,7 @@
           <a:p>
             <a:fld id="{A7C9CC5A-7358-4334-9046-5B2A00250028}" type="datetimeFigureOut">
               <a:rPr lang="en-IE" smtClean="0"/>
-              <a:t>22/01/2019</a:t>
+              <a:t>23/01/2019</a:t>
             </a:fld>
             <a:endParaRPr lang="en-IE"/>
           </a:p>
@@ -1742,7 +1742,7 @@
           <a:p>
             <a:fld id="{A7C9CC5A-7358-4334-9046-5B2A00250028}" type="datetimeFigureOut">
               <a:rPr lang="en-IE" smtClean="0"/>
-              <a:t>22/01/2019</a:t>
+              <a:t>23/01/2019</a:t>
             </a:fld>
             <a:endParaRPr lang="en-IE"/>
           </a:p>
@@ -1837,7 +1837,7 @@
           <a:p>
             <a:fld id="{A7C9CC5A-7358-4334-9046-5B2A00250028}" type="datetimeFigureOut">
               <a:rPr lang="en-IE" smtClean="0"/>
-              <a:t>22/01/2019</a:t>
+              <a:t>23/01/2019</a:t>
             </a:fld>
             <a:endParaRPr lang="en-IE"/>
           </a:p>
@@ -2114,7 +2114,7 @@
           <a:p>
             <a:fld id="{A7C9CC5A-7358-4334-9046-5B2A00250028}" type="datetimeFigureOut">
               <a:rPr lang="en-IE" smtClean="0"/>
-              <a:t>22/01/2019</a:t>
+              <a:t>23/01/2019</a:t>
             </a:fld>
             <a:endParaRPr lang="en-IE"/>
           </a:p>
@@ -2367,7 +2367,7 @@
           <a:p>
             <a:fld id="{A7C9CC5A-7358-4334-9046-5B2A00250028}" type="datetimeFigureOut">
               <a:rPr lang="en-IE" smtClean="0"/>
-              <a:t>22/01/2019</a:t>
+              <a:t>23/01/2019</a:t>
             </a:fld>
             <a:endParaRPr lang="en-IE"/>
           </a:p>
@@ -2580,7 +2580,7 @@
           <a:p>
             <a:fld id="{A7C9CC5A-7358-4334-9046-5B2A00250028}" type="datetimeFigureOut">
               <a:rPr lang="en-IE" smtClean="0"/>
-              <a:t>22/01/2019</a:t>
+              <a:t>23/01/2019</a:t>
             </a:fld>
             <a:endParaRPr lang="en-IE"/>
           </a:p>
@@ -3025,13 +3025,8 @@
           <a:p>
             <a:r>
               <a:rPr lang="en-IE" dirty="0" smtClean="0"/>
-              <a:t>Billy </a:t>
-            </a:r>
-            <a:r>
-              <a:rPr lang="en-IE" dirty="0" smtClean="0"/>
-              <a:t>Stack/Marta Doberschuetz O’Shaughnessy </a:t>
-            </a:r>
-            <a:endParaRPr lang="en-IE" dirty="0" smtClean="0"/>
+              <a:t>Billy Stack/Marta Doberschuetz O’Shaughnessy </a:t>
+            </a:r>
           </a:p>
         </p:txBody>
       </p:sp>
@@ -4194,11 +4189,7 @@
           <a:p>
             <a:r>
               <a:rPr lang="en-IE" dirty="0" smtClean="0"/>
-              <a:t>Each </a:t>
-            </a:r>
-            <a:r>
-              <a:rPr lang="en-IE" dirty="0" smtClean="0"/>
-              <a:t>function returns new instance of Cat attached to different state type – side effect free</a:t>
+              <a:t>Each function returns new instance of Cat attached to different state type – side effect free</a:t>
             </a:r>
             <a:endParaRPr lang="en-IE" dirty="0"/>
           </a:p>
@@ -4833,12 +4824,12 @@
               <a:t>What </a:t>
             </a:r>
             <a:r>
-              <a:rPr lang="en-IE" dirty="0" err="1" smtClean="0"/>
-              <a:t>im</a:t>
-            </a:r>
-            <a:r>
-              <a:rPr lang="en-IE" dirty="0" smtClean="0"/>
-              <a:t> going to talk about</a:t>
+              <a:rPr lang="en-IE" dirty="0" smtClean="0"/>
+              <a:t>we are </a:t>
+            </a:r>
+            <a:r>
+              <a:rPr lang="en-IE" dirty="0" smtClean="0"/>
+              <a:t>going to talk about</a:t>
             </a:r>
             <a:endParaRPr lang="en-IE" dirty="0"/>
           </a:p>
@@ -4857,7 +4848,7 @@
         <p:spPr/>
         <p:txBody>
           <a:bodyPr>
-            <a:normAutofit/>
+            <a:normAutofit lnSpcReduction="10000"/>
           </a:bodyPr>
           <a:lstStyle/>
           <a:p>
@@ -4916,8 +4907,19 @@
             <a:pPr lvl="1"/>
             <a:r>
               <a:rPr lang="en-IE" dirty="0" smtClean="0"/>
-              <a:t>Declarative Code (vs Imperative code)</a:t>
-            </a:r>
+              <a:t>Declarative Code (vs Imperative code</a:t>
+            </a:r>
+            <a:r>
+              <a:rPr lang="en-IE" dirty="0" smtClean="0"/>
+              <a:t>)</a:t>
+            </a:r>
+          </a:p>
+          <a:p>
+            <a:r>
+              <a:rPr lang="en-IE" dirty="0" smtClean="0"/>
+              <a:t>Other stuff</a:t>
+            </a:r>
+            <a:endParaRPr lang="en-IE" dirty="0" smtClean="0"/>
           </a:p>
           <a:p>
             <a:pPr lvl="1"/>
@@ -5021,28 +5023,9 @@
           </a:p>
         </p:txBody>
       </p:sp>
-      <p:sp>
-        <p:nvSpPr>
-          <p:cNvPr id="3" name="Content Placeholder 2"/>
-          <p:cNvSpPr>
-            <a:spLocks noGrp="1"/>
-          </p:cNvSpPr>
-          <p:nvPr>
-            <p:ph idx="1"/>
-          </p:nvPr>
-        </p:nvSpPr>
-        <p:spPr/>
-        <p:txBody>
-          <a:bodyPr/>
-          <a:lstStyle/>
-          <a:p>
-            <a:endParaRPr lang="en-IE"/>
-          </a:p>
-        </p:txBody>
-      </p:sp>
       <p:pic>
         <p:nvPicPr>
-          <p:cNvPr id="5" name="Picture 4"/>
+          <p:cNvPr id="7" name="Picture 6"/>
           <p:cNvPicPr>
             <a:picLocks noChangeAspect="1"/>
           </p:cNvPicPr>
@@ -5056,32 +5039,8 @@
         </p:blipFill>
         <p:spPr>
           <a:xfrm>
-            <a:off x="865713" y="1492336"/>
-            <a:ext cx="10488087" cy="4768421"/>
-          </a:xfrm>
-          <a:prstGeom prst="rect">
-            <a:avLst/>
-          </a:prstGeom>
-        </p:spPr>
-      </p:pic>
-      <p:pic>
-        <p:nvPicPr>
-          <p:cNvPr id="6" name="Picture 5"/>
-          <p:cNvPicPr>
-            <a:picLocks noChangeAspect="1"/>
-          </p:cNvPicPr>
-          <p:nvPr/>
-        </p:nvPicPr>
-        <p:blipFill>
-          <a:blip r:embed="rId3"/>
-          <a:stretch>
-            <a:fillRect/>
-          </a:stretch>
-        </p:blipFill>
-        <p:spPr>
-          <a:xfrm>
-            <a:off x="345621" y="6041843"/>
-            <a:ext cx="3009900" cy="704850"/>
+            <a:off x="956310" y="1030468"/>
+            <a:ext cx="9398652" cy="5987851"/>
           </a:xfrm>
           <a:prstGeom prst="rect">
             <a:avLst/>
@@ -5098,6 +5057,13 @@
   <p:clrMapOvr>
     <a:masterClrMapping/>
   </p:clrMapOvr>
+  <p:timing>
+    <p:tnLst>
+      <p:par>
+        <p:cTn id="1" dur="indefinite" restart="never" nodeType="tmRoot"/>
+      </p:par>
+    </p:tnLst>
+  </p:timing>
 </p:sld>
 </file>
 
@@ -5199,6 +5165,13 @@
   <p:clrMapOvr>
     <a:masterClrMapping/>
   </p:clrMapOvr>
+  <p:timing>
+    <p:tnLst>
+      <p:par>
+        <p:cTn id="1" dur="indefinite" restart="never" nodeType="tmRoot"/>
+      </p:par>
+    </p:tnLst>
+  </p:timing>
 </p:sld>
 </file>
 
@@ -5352,6 +5325,13 @@
   <p:clrMapOvr>
     <a:masterClrMapping/>
   </p:clrMapOvr>
+  <p:timing>
+    <p:tnLst>
+      <p:par>
+        <p:cTn id="1" dur="indefinite" restart="never" nodeType="tmRoot"/>
+      </p:par>
+    </p:tnLst>
+  </p:timing>
 </p:sld>
 </file>
 

</xml_diff>